<commit_message>
added a ggplot theme, adjusted ppt template.  Tryna make things look prettier
</commit_message>
<xml_diff>
--- a/lectures/template.pptx
+++ b/lectures/template.pptx
@@ -7,16 +7,6 @@
   <p:sldIdLst>
     <p:sldId id="256" r:id="rId2"/>
     <p:sldId id="257" r:id="rId3"/>
-    <p:sldId id="258" r:id="rId4"/>
-    <p:sldId id="259" r:id="rId5"/>
-    <p:sldId id="260" r:id="rId6"/>
-    <p:sldId id="261" r:id="rId7"/>
-    <p:sldId id="262" r:id="rId8"/>
-    <p:sldId id="263" r:id="rId9"/>
-    <p:sldId id="264" r:id="rId10"/>
-    <p:sldId id="267" r:id="rId11"/>
-    <p:sldId id="269" r:id="rId12"/>
-    <p:sldId id="268" r:id="rId13"/>
   </p:sldIdLst>
   <p:sldSz cx="12192000" cy="6858000"/>
   <p:notesSz cx="6858000" cy="9144000"/>
@@ -313,7 +303,7 @@
           <a:p>
             <a:fld id="{241EB5C9-1307-BA42-ABA2-0BC069CD8E7F}" type="datetimeFigureOut">
               <a:rPr lang="en-US" smtClean="0"/>
-              <a:t>1/6/20</a:t>
+              <a:t>1/8/20</a:t>
             </a:fld>
             <a:endParaRPr lang="en-US"/>
           </a:p>
@@ -481,7 +471,7 @@
           <a:p>
             <a:fld id="{241EB5C9-1307-BA42-ABA2-0BC069CD8E7F}" type="datetimeFigureOut">
               <a:rPr lang="en-US" smtClean="0"/>
-              <a:t>1/6/20</a:t>
+              <a:t>1/8/20</a:t>
             </a:fld>
             <a:endParaRPr lang="en-US"/>
           </a:p>
@@ -659,7 +649,7 @@
           <a:p>
             <a:fld id="{241EB5C9-1307-BA42-ABA2-0BC069CD8E7F}" type="datetimeFigureOut">
               <a:rPr lang="en-US" smtClean="0"/>
-              <a:t>1/6/20</a:t>
+              <a:t>1/8/20</a:t>
             </a:fld>
             <a:endParaRPr lang="en-US"/>
           </a:p>
@@ -844,7 +834,7 @@
           <a:p>
             <a:fld id="{241EB5C9-1307-BA42-ABA2-0BC069CD8E7F}" type="datetimeFigureOut">
               <a:rPr lang="en-US" smtClean="0"/>
-              <a:t>1/6/20</a:t>
+              <a:t>1/8/20</a:t>
             </a:fld>
             <a:endParaRPr lang="en-US"/>
           </a:p>
@@ -1089,7 +1079,7 @@
           <a:p>
             <a:fld id="{241EB5C9-1307-BA42-ABA2-0BC069CD8E7F}" type="datetimeFigureOut">
               <a:rPr lang="en-US" smtClean="0"/>
-              <a:t>1/6/20</a:t>
+              <a:t>1/8/20</a:t>
             </a:fld>
             <a:endParaRPr lang="en-US"/>
           </a:p>
@@ -1374,7 +1364,7 @@
           <a:p>
             <a:fld id="{241EB5C9-1307-BA42-ABA2-0BC069CD8E7F}" type="datetimeFigureOut">
               <a:rPr lang="en-US" smtClean="0"/>
-              <a:t>1/6/20</a:t>
+              <a:t>1/8/20</a:t>
             </a:fld>
             <a:endParaRPr lang="en-US"/>
           </a:p>
@@ -1793,7 +1783,7 @@
           <a:p>
             <a:fld id="{241EB5C9-1307-BA42-ABA2-0BC069CD8E7F}" type="datetimeFigureOut">
               <a:rPr lang="en-US" smtClean="0"/>
-              <a:t>1/6/20</a:t>
+              <a:t>1/8/20</a:t>
             </a:fld>
             <a:endParaRPr lang="en-US"/>
           </a:p>
@@ -1910,7 +1900,7 @@
           <a:p>
             <a:fld id="{241EB5C9-1307-BA42-ABA2-0BC069CD8E7F}" type="datetimeFigureOut">
               <a:rPr lang="en-US" smtClean="0"/>
-              <a:t>1/6/20</a:t>
+              <a:t>1/8/20</a:t>
             </a:fld>
             <a:endParaRPr lang="en-US"/>
           </a:p>
@@ -2005,7 +1995,7 @@
           <a:p>
             <a:fld id="{241EB5C9-1307-BA42-ABA2-0BC069CD8E7F}" type="datetimeFigureOut">
               <a:rPr lang="en-US" smtClean="0"/>
-              <a:t>1/6/20</a:t>
+              <a:t>1/8/20</a:t>
             </a:fld>
             <a:endParaRPr lang="en-US"/>
           </a:p>
@@ -2280,7 +2270,7 @@
           <a:p>
             <a:fld id="{241EB5C9-1307-BA42-ABA2-0BC069CD8E7F}" type="datetimeFigureOut">
               <a:rPr lang="en-US" smtClean="0"/>
-              <a:t>1/6/20</a:t>
+              <a:t>1/8/20</a:t>
             </a:fld>
             <a:endParaRPr lang="en-US"/>
           </a:p>
@@ -2532,7 +2522,7 @@
           <a:p>
             <a:fld id="{241EB5C9-1307-BA42-ABA2-0BC069CD8E7F}" type="datetimeFigureOut">
               <a:rPr lang="en-US" smtClean="0"/>
-              <a:t>1/6/20</a:t>
+              <a:t>1/8/20</a:t>
             </a:fld>
             <a:endParaRPr lang="en-US"/>
           </a:p>
@@ -2743,7 +2733,7 @@
           <a:p>
             <a:fld id="{241EB5C9-1307-BA42-ABA2-0BC069CD8E7F}" type="datetimeFigureOut">
               <a:rPr lang="en-US" smtClean="0"/>
-              <a:t>1/6/20</a:t>
+              <a:t>1/8/20</a:t>
             </a:fld>
             <a:endParaRPr lang="en-US"/>
           </a:p>
@@ -3123,7 +3113,13 @@
       </p:grpSpPr>
       <p:sp>
         <p:nvSpPr>
-          <p:cNvPr id="2" name="Title 1"/>
+          <p:cNvPr id="2" name="Title 1">
+            <a:extLst>
+              <a:ext uri="{FF2B5EF4-FFF2-40B4-BE49-F238E27FC236}">
+                <a16:creationId xmlns:a16="http://schemas.microsoft.com/office/drawing/2014/main" id="{74DD93CC-B88B-5648-8747-687C76B01E1A}"/>
+              </a:ext>
+            </a:extLst>
+          </p:cNvPr>
           <p:cNvSpPr>
             <a:spLocks noGrp="1"/>
           </p:cNvSpPr>
@@ -3131,26 +3127,24 @@
             <p:ph type="ctrTitle"/>
           </p:nvPr>
         </p:nvSpPr>
-        <p:spPr>
-          <a:xfrm>
-            <a:off x="2209800" y="2130426"/>
-            <a:ext cx="7772400" cy="1470025"/>
-          </a:xfrm>
-        </p:spPr>
-        <p:txBody>
-          <a:bodyPr/>
-          <a:lstStyle/>
-          <a:p>
-            <a:r>
-              <a:rPr dirty="0"/>
-              <a:t>Welcome to Ecological Statistics and Data!</a:t>
-            </a:r>
-          </a:p>
-        </p:txBody>
-      </p:sp>
-      <p:sp>
-        <p:nvSpPr>
-          <p:cNvPr id="3" name="Subtitle 2"/>
+        <p:spPr/>
+        <p:txBody>
+          <a:bodyPr/>
+          <a:lstStyle/>
+          <a:p>
+            <a:endParaRPr lang="en-US"/>
+          </a:p>
+        </p:txBody>
+      </p:sp>
+      <p:sp>
+        <p:nvSpPr>
+          <p:cNvPr id="3" name="Subtitle 2">
+            <a:extLst>
+              <a:ext uri="{FF2B5EF4-FFF2-40B4-BE49-F238E27FC236}">
+                <a16:creationId xmlns:a16="http://schemas.microsoft.com/office/drawing/2014/main" id="{14CA5827-030E-7A40-929C-2949ACC3A919}"/>
+              </a:ext>
+            </a:extLst>
+          </p:cNvPr>
           <p:cNvSpPr>
             <a:spLocks noGrp="1"/>
           </p:cNvSpPr>
@@ -3158,355 +3152,21 @@
             <p:ph type="subTitle" idx="1"/>
           </p:nvPr>
         </p:nvSpPr>
-        <p:spPr>
-          <a:xfrm>
-            <a:off x="2895600" y="3886200"/>
-            <a:ext cx="6400800" cy="1752600"/>
-          </a:xfrm>
-        </p:spPr>
-        <p:txBody>
-          <a:bodyPr/>
-          <a:lstStyle/>
-          <a:p>
-            <a:br>
-              <a:rPr dirty="0"/>
-            </a:br>
-            <a:br>
-              <a:rPr dirty="0"/>
-            </a:br>
-            <a:r>
-              <a:rPr dirty="0"/>
-              <a:t>Eric Scott</a:t>
-            </a:r>
-          </a:p>
-        </p:txBody>
-      </p:sp>
-      <p:sp>
-        <p:nvSpPr>
-          <p:cNvPr id="4" name="Date Placeholder 3"/>
-          <p:cNvSpPr>
-            <a:spLocks noGrp="1"/>
-          </p:cNvSpPr>
-          <p:nvPr>
-            <p:ph type="dt" sz="half" idx="10"/>
-          </p:nvPr>
-        </p:nvSpPr>
-        <p:spPr/>
-        <p:txBody>
-          <a:bodyPr/>
-          <a:lstStyle/>
-          <a:p>
-            <a:r>
-              <a:t>2019-01-16</a:t>
-            </a:r>
-          </a:p>
-        </p:txBody>
-      </p:sp>
-    </p:spTree>
-  </p:cSld>
-  <p:clrMapOvr>
-    <a:masterClrMapping/>
-  </p:clrMapOvr>
-</p:sld>
-</file>
-
-<file path=ppt/slides/slide10.xml><?xml version="1.0" encoding="utf-8"?>
-<p:sld xmlns:a="http://schemas.openxmlformats.org/drawingml/2006/main" xmlns:r="http://schemas.openxmlformats.org/officeDocument/2006/relationships" xmlns:p="http://schemas.openxmlformats.org/presentationml/2006/main">
-  <p:cSld>
-    <p:spTree>
-      <p:nvGrpSpPr>
-        <p:cNvPr id="1" name=""/>
-        <p:cNvGrpSpPr/>
-        <p:nvPr/>
-      </p:nvGrpSpPr>
-      <p:grpSpPr>
-        <a:xfrm>
-          <a:off x="0" y="0"/>
-          <a:ext cx="0" cy="0"/>
-          <a:chOff x="0" y="0"/>
-          <a:chExt cx="0" cy="0"/>
-        </a:xfrm>
-      </p:grpSpPr>
-      <p:sp>
-        <p:nvSpPr>
-          <p:cNvPr id="2" name="Title 1"/>
-          <p:cNvSpPr>
-            <a:spLocks noGrp="1"/>
-          </p:cNvSpPr>
-          <p:nvPr>
-            <p:ph type="title"/>
-          </p:nvPr>
-        </p:nvSpPr>
-        <p:spPr/>
-        <p:txBody>
-          <a:bodyPr>
-            <a:normAutofit/>
-          </a:bodyPr>
-          <a:lstStyle/>
-          <a:p>
-            <a:r>
-              <a:rPr dirty="0"/>
-              <a:t>Sampling and Scope of Inference</a:t>
-            </a:r>
-          </a:p>
-        </p:txBody>
-      </p:sp>
-      <p:sp>
-        <p:nvSpPr>
-          <p:cNvPr id="3" name="Content Placeholder 2"/>
-          <p:cNvSpPr>
-            <a:spLocks noGrp="1"/>
-          </p:cNvSpPr>
-          <p:nvPr>
-            <p:ph idx="1"/>
-          </p:nvPr>
-        </p:nvSpPr>
-        <p:spPr/>
-        <p:txBody>
-          <a:bodyPr>
-            <a:normAutofit/>
-          </a:bodyPr>
-          <a:lstStyle/>
-          <a:p>
-            <a:r>
-              <a:rPr dirty="0"/>
-              <a:t>Definition of probability assumes trials are representative of a “population”</a:t>
-            </a:r>
-          </a:p>
-          <a:p>
-            <a:r>
-              <a:rPr dirty="0"/>
-              <a:t>“population” (statistics definition) = larger group for which you estimating the probability</a:t>
-            </a:r>
-          </a:p>
-          <a:p>
-            <a:r>
-              <a:rPr dirty="0"/>
-              <a:t>Trials should be </a:t>
-            </a:r>
-            <a:r>
-              <a:rPr b="1" dirty="0"/>
-              <a:t>representative</a:t>
-            </a:r>
-            <a:r>
-              <a:rPr dirty="0"/>
-              <a:t> and </a:t>
-            </a:r>
-            <a:r>
-              <a:rPr b="1" dirty="0"/>
-              <a:t>independent</a:t>
-            </a:r>
-            <a:r>
-              <a:rPr dirty="0"/>
-              <a:t>.</a:t>
-            </a:r>
-            <a:endParaRPr lang="en-US" dirty="0"/>
-          </a:p>
-          <a:p>
-            <a:r>
-              <a:rPr dirty="0"/>
-              <a:t>Sampling types: </a:t>
-            </a:r>
-            <a:endParaRPr lang="en-US" dirty="0"/>
-          </a:p>
-          <a:p>
-            <a:pPr lvl="1"/>
-            <a:r>
-              <a:rPr dirty="0"/>
-              <a:t>Random </a:t>
-            </a:r>
-            <a:endParaRPr lang="en-US" dirty="0"/>
-          </a:p>
-          <a:p>
-            <a:pPr lvl="1"/>
-            <a:r>
-              <a:rPr dirty="0"/>
-              <a:t>Stratified (e.g. randomly selected transects) </a:t>
-            </a:r>
-            <a:endParaRPr lang="en-US" dirty="0"/>
-          </a:p>
-          <a:p>
-            <a:pPr lvl="1"/>
-            <a:r>
-              <a:rPr dirty="0"/>
-              <a:t>Systematic (e.g. every 10 paces along transect) </a:t>
-            </a:r>
-            <a:endParaRPr lang="en-US" dirty="0"/>
-          </a:p>
-          <a:p>
-            <a:pPr lvl="1"/>
-            <a:r>
-              <a:rPr dirty="0"/>
-              <a:t>Haphazard</a:t>
-            </a:r>
-          </a:p>
-        </p:txBody>
-      </p:sp>
-    </p:spTree>
-  </p:cSld>
-  <p:clrMapOvr>
-    <a:masterClrMapping/>
-  </p:clrMapOvr>
-</p:sld>
-</file>
-
-<file path=ppt/slides/slide11.xml><?xml version="1.0" encoding="utf-8"?>
-<p:sld xmlns:a="http://schemas.openxmlformats.org/drawingml/2006/main" xmlns:r="http://schemas.openxmlformats.org/officeDocument/2006/relationships" xmlns:p="http://schemas.openxmlformats.org/presentationml/2006/main">
-  <p:cSld>
-    <p:spTree>
-      <p:nvGrpSpPr>
-        <p:cNvPr id="1" name=""/>
-        <p:cNvGrpSpPr/>
-        <p:nvPr/>
-      </p:nvGrpSpPr>
-      <p:grpSpPr>
-        <a:xfrm>
-          <a:off x="0" y="0"/>
-          <a:ext cx="0" cy="0"/>
-          <a:chOff x="0" y="0"/>
-          <a:chExt cx="0" cy="0"/>
-        </a:xfrm>
-      </p:grpSpPr>
-      <p:sp>
-        <p:nvSpPr>
-          <p:cNvPr id="2" name="Title 1"/>
-          <p:cNvSpPr>
-            <a:spLocks noGrp="1"/>
-          </p:cNvSpPr>
-          <p:nvPr>
-            <p:ph type="title"/>
-          </p:nvPr>
-        </p:nvSpPr>
-        <p:spPr/>
-        <p:txBody>
-          <a:bodyPr>
-            <a:normAutofit/>
-          </a:bodyPr>
-          <a:lstStyle/>
-          <a:p>
-            <a:r>
-              <a:t>Sampling and Scope of Inference</a:t>
-            </a:r>
-          </a:p>
-        </p:txBody>
-      </p:sp>
-      <p:sp>
-        <p:nvSpPr>
-          <p:cNvPr id="3" name="Content Placeholder 2"/>
-          <p:cNvSpPr>
-            <a:spLocks noGrp="1"/>
-          </p:cNvSpPr>
-          <p:nvPr>
-            <p:ph idx="1"/>
-          </p:nvPr>
-        </p:nvSpPr>
-        <p:spPr/>
-        <p:txBody>
-          <a:bodyPr>
-            <a:normAutofit/>
-          </a:bodyPr>
-          <a:lstStyle/>
-          <a:p>
-            <a:r>
-              <a:rPr lang="en-US" dirty="0"/>
-              <a:t>Scope of inference = “population” over which your data are a </a:t>
-            </a:r>
-            <a:r>
-              <a:rPr lang="en-US" b="1" dirty="0"/>
-              <a:t>representative</a:t>
-            </a:r>
-            <a:r>
-              <a:rPr lang="en-US" dirty="0"/>
-              <a:t> and </a:t>
-            </a:r>
-            <a:r>
-              <a:rPr lang="en-US" b="1" dirty="0"/>
-              <a:t>independent</a:t>
-            </a:r>
-            <a:r>
-              <a:rPr lang="en-US" dirty="0"/>
-              <a:t> observations</a:t>
-            </a:r>
-            <a:endParaRPr dirty="0"/>
+        <p:spPr/>
+        <p:txBody>
+          <a:bodyPr/>
+          <a:lstStyle/>
+          <a:p>
+            <a:endParaRPr lang="en-US"/>
           </a:p>
         </p:txBody>
       </p:sp>
     </p:spTree>
     <p:extLst>
       <p:ext uri="{BB962C8B-B14F-4D97-AF65-F5344CB8AC3E}">
-        <p14:creationId xmlns:p14="http://schemas.microsoft.com/office/powerpoint/2010/main" val="4019222719"/>
+        <p14:creationId xmlns:p14="http://schemas.microsoft.com/office/powerpoint/2010/main" val="1443198795"/>
       </p:ext>
     </p:extLst>
-  </p:cSld>
-  <p:clrMapOvr>
-    <a:masterClrMapping/>
-  </p:clrMapOvr>
-</p:sld>
-</file>
-
-<file path=ppt/slides/slide12.xml><?xml version="1.0" encoding="utf-8"?>
-<p:sld xmlns:a="http://schemas.openxmlformats.org/drawingml/2006/main" xmlns:r="http://schemas.openxmlformats.org/officeDocument/2006/relationships" xmlns:p="http://schemas.openxmlformats.org/presentationml/2006/main">
-  <p:cSld>
-    <p:spTree>
-      <p:nvGrpSpPr>
-        <p:cNvPr id="1" name=""/>
-        <p:cNvGrpSpPr/>
-        <p:nvPr/>
-      </p:nvGrpSpPr>
-      <p:grpSpPr>
-        <a:xfrm>
-          <a:off x="0" y="0"/>
-          <a:ext cx="0" cy="0"/>
-          <a:chOff x="0" y="0"/>
-          <a:chExt cx="0" cy="0"/>
-        </a:xfrm>
-      </p:grpSpPr>
-      <p:sp>
-        <p:nvSpPr>
-          <p:cNvPr id="2" name="Title 1"/>
-          <p:cNvSpPr>
-            <a:spLocks noGrp="1"/>
-          </p:cNvSpPr>
-          <p:nvPr>
-            <p:ph type="title"/>
-          </p:nvPr>
-        </p:nvSpPr>
-        <p:spPr/>
-        <p:txBody>
-          <a:bodyPr/>
-          <a:lstStyle/>
-          <a:p>
-            <a:r>
-              <a:t>Homework</a:t>
-            </a:r>
-          </a:p>
-        </p:txBody>
-      </p:sp>
-      <p:sp>
-        <p:nvSpPr>
-          <p:cNvPr id="3" name="Content Placeholder 2"/>
-          <p:cNvSpPr>
-            <a:spLocks noGrp="1"/>
-          </p:cNvSpPr>
-          <p:nvPr>
-            <p:ph idx="1"/>
-          </p:nvPr>
-        </p:nvSpPr>
-        <p:spPr/>
-        <p:txBody>
-          <a:bodyPr/>
-          <a:lstStyle/>
-          <a:p>
-            <a:pPr marL="0" indent="0">
-              <a:buNone/>
-            </a:pPr>
-            <a:r>
-              <a:t>Measure a probability of some event by sampling a population.</a:t>
-            </a:r>
-          </a:p>
-        </p:txBody>
-      </p:sp>
-    </p:spTree>
   </p:cSld>
   <p:clrMapOvr>
     <a:masterClrMapping/>
@@ -3533,7 +3193,13 @@
       </p:grpSpPr>
       <p:sp>
         <p:nvSpPr>
-          <p:cNvPr id="2" name="Title 1"/>
+          <p:cNvPr id="2" name="Title 1">
+            <a:extLst>
+              <a:ext uri="{FF2B5EF4-FFF2-40B4-BE49-F238E27FC236}">
+                <a16:creationId xmlns:a16="http://schemas.microsoft.com/office/drawing/2014/main" id="{12FE1563-076F-214A-84C9-BED5C6F56AE2}"/>
+              </a:ext>
+            </a:extLst>
+          </p:cNvPr>
           <p:cNvSpPr>
             <a:spLocks noGrp="1"/>
           </p:cNvSpPr>
@@ -3546,15 +3212,19 @@
           <a:bodyPr/>
           <a:lstStyle/>
           <a:p>
-            <a:r>
-              <a:t>Overview</a:t>
-            </a:r>
-          </a:p>
-        </p:txBody>
-      </p:sp>
-      <p:sp>
-        <p:nvSpPr>
-          <p:cNvPr id="3" name="Content Placeholder 2"/>
+            <a:endParaRPr lang="en-US"/>
+          </a:p>
+        </p:txBody>
+      </p:sp>
+      <p:sp>
+        <p:nvSpPr>
+          <p:cNvPr id="3" name="Content Placeholder 2">
+            <a:extLst>
+              <a:ext uri="{FF2B5EF4-FFF2-40B4-BE49-F238E27FC236}">
+                <a16:creationId xmlns:a16="http://schemas.microsoft.com/office/drawing/2014/main" id="{4F6BC04F-9DC5-8F47-A2AC-798F94CE7504}"/>
+              </a:ext>
+            </a:extLst>
+          </p:cNvPr>
           <p:cNvSpPr>
             <a:spLocks noGrp="1"/>
           </p:cNvSpPr>
@@ -3567,2066 +3237,20 @@
           <a:bodyPr/>
           <a:lstStyle/>
           <a:p>
-            <a:r>
-              <a:rPr dirty="0"/>
-              <a:t>20th century: design experiments to fit statistical analysis assumptions</a:t>
-            </a:r>
-            <a:br>
-              <a:rPr dirty="0"/>
-            </a:br>
-            <a:endParaRPr dirty="0"/>
-          </a:p>
-          <a:p>
-            <a:r>
-              <a:rPr dirty="0"/>
-              <a:t>21st century: option to design statistical models to be more like data</a:t>
-            </a:r>
-          </a:p>
-          <a:p>
-            <a:pPr lvl="1"/>
-            <a:r>
-              <a:rPr dirty="0"/>
-              <a:t>Focus on linear models and their extensions</a:t>
-            </a:r>
+            <a:endParaRPr lang="en-US"/>
           </a:p>
         </p:txBody>
       </p:sp>
     </p:spTree>
+    <p:extLst>
+      <p:ext uri="{BB962C8B-B14F-4D97-AF65-F5344CB8AC3E}">
+        <p14:creationId xmlns:p14="http://schemas.microsoft.com/office/powerpoint/2010/main" val="1240264674"/>
+      </p:ext>
+    </p:extLst>
   </p:cSld>
   <p:clrMapOvr>
     <a:masterClrMapping/>
   </p:clrMapOvr>
-</p:sld>
-</file>
-
-<file path=ppt/slides/slide3.xml><?xml version="1.0" encoding="utf-8"?>
-<p:sld xmlns:a="http://schemas.openxmlformats.org/drawingml/2006/main" xmlns:r="http://schemas.openxmlformats.org/officeDocument/2006/relationships" xmlns:p="http://schemas.openxmlformats.org/presentationml/2006/main">
-  <p:cSld>
-    <p:spTree>
-      <p:nvGrpSpPr>
-        <p:cNvPr id="1" name=""/>
-        <p:cNvGrpSpPr/>
-        <p:nvPr/>
-      </p:nvGrpSpPr>
-      <p:grpSpPr>
-        <a:xfrm>
-          <a:off x="0" y="0"/>
-          <a:ext cx="0" cy="0"/>
-          <a:chOff x="0" y="0"/>
-          <a:chExt cx="0" cy="0"/>
-        </a:xfrm>
-      </p:grpSpPr>
-      <p:sp>
-        <p:nvSpPr>
-          <p:cNvPr id="2" name="Title 1"/>
-          <p:cNvSpPr>
-            <a:spLocks noGrp="1"/>
-          </p:cNvSpPr>
-          <p:nvPr>
-            <p:ph type="title"/>
-          </p:nvPr>
-        </p:nvSpPr>
-        <p:spPr/>
-        <p:txBody>
-          <a:bodyPr/>
-          <a:lstStyle/>
-          <a:p>
-            <a:r>
-              <a:t>Why “Ecological” statistics?</a:t>
-            </a:r>
-          </a:p>
-        </p:txBody>
-      </p:sp>
-      <p:sp>
-        <p:nvSpPr>
-          <p:cNvPr id="3" name="Content Placeholder 2"/>
-          <p:cNvSpPr>
-            <a:spLocks noGrp="1"/>
-          </p:cNvSpPr>
-          <p:nvPr>
-            <p:ph idx="1"/>
-          </p:nvPr>
-        </p:nvSpPr>
-        <p:spPr/>
-        <p:txBody>
-          <a:bodyPr/>
-          <a:lstStyle/>
-          <a:p>
-            <a:r>
-              <a:rPr dirty="0"/>
-              <a:t>Ecologists often count things and watch when they reproduce and die</a:t>
-            </a:r>
-          </a:p>
-          <a:p>
-            <a:r>
-              <a:rPr dirty="0"/>
-              <a:t>These types of data have special properties</a:t>
-            </a:r>
-          </a:p>
-          <a:p>
-            <a:r>
-              <a:rPr dirty="0"/>
-              <a:t>Violate assumptions of statistical tests typically covered in more general or introductory courses</a:t>
-            </a:r>
-          </a:p>
-        </p:txBody>
-      </p:sp>
-    </p:spTree>
-  </p:cSld>
-  <p:clrMapOvr>
-    <a:masterClrMapping/>
-  </p:clrMapOvr>
-</p:sld>
-</file>
-
-<file path=ppt/slides/slide4.xml><?xml version="1.0" encoding="utf-8"?>
-<p:sld xmlns:a="http://schemas.openxmlformats.org/drawingml/2006/main" xmlns:r="http://schemas.openxmlformats.org/officeDocument/2006/relationships" xmlns:p="http://schemas.openxmlformats.org/presentationml/2006/main">
-  <p:cSld>
-    <p:spTree>
-      <p:nvGrpSpPr>
-        <p:cNvPr id="1" name=""/>
-        <p:cNvGrpSpPr/>
-        <p:nvPr/>
-      </p:nvGrpSpPr>
-      <p:grpSpPr>
-        <a:xfrm>
-          <a:off x="0" y="0"/>
-          <a:ext cx="0" cy="0"/>
-          <a:chOff x="0" y="0"/>
-          <a:chExt cx="0" cy="0"/>
-        </a:xfrm>
-      </p:grpSpPr>
-      <p:sp>
-        <p:nvSpPr>
-          <p:cNvPr id="2" name="Title 1"/>
-          <p:cNvSpPr>
-            <a:spLocks noGrp="1"/>
-          </p:cNvSpPr>
-          <p:nvPr>
-            <p:ph type="title"/>
-          </p:nvPr>
-        </p:nvSpPr>
-        <p:spPr/>
-        <p:txBody>
-          <a:bodyPr/>
-          <a:lstStyle/>
-          <a:p>
-            <a:r>
-              <a:t>Introductions</a:t>
-            </a:r>
-          </a:p>
-        </p:txBody>
-      </p:sp>
-      <p:sp>
-        <p:nvSpPr>
-          <p:cNvPr id="3" name="Content Placeholder 2"/>
-          <p:cNvSpPr>
-            <a:spLocks noGrp="1"/>
-          </p:cNvSpPr>
-          <p:nvPr>
-            <p:ph idx="1"/>
-          </p:nvPr>
-        </p:nvSpPr>
-        <p:spPr/>
-        <p:txBody>
-          <a:bodyPr>
-            <a:normAutofit/>
-          </a:bodyPr>
-          <a:lstStyle/>
-          <a:p>
-            <a:pPr marL="0" indent="0">
-              <a:buNone/>
-            </a:pPr>
-            <a:r>
-              <a:rPr dirty="0"/>
-              <a:t>The team:</a:t>
-            </a:r>
-          </a:p>
-          <a:p>
-            <a:r>
-              <a:rPr dirty="0"/>
-              <a:t>Eric Scott (</a:t>
-            </a:r>
-            <a:r>
-              <a:rPr dirty="0">
-                <a:hlinkClick r:id="rId2"/>
-              </a:rPr>
-              <a:t>eric.scott@tufts.edu</a:t>
-            </a:r>
-            <a:r>
-              <a:rPr dirty="0"/>
-              <a:t>)</a:t>
-            </a:r>
-          </a:p>
-          <a:p>
-            <a:r>
-              <a:rPr dirty="0"/>
-              <a:t>Avalon Owens (</a:t>
-            </a:r>
-            <a:r>
-              <a:rPr dirty="0">
-                <a:hlinkClick r:id="rId3"/>
-              </a:rPr>
-              <a:t>avalon.owens@tufts.edu</a:t>
-            </a:r>
-            <a:r>
-              <a:rPr dirty="0"/>
-              <a:t>)</a:t>
-            </a:r>
-          </a:p>
-          <a:p>
-            <a:pPr marL="0" indent="0">
-              <a:buNone/>
-            </a:pPr>
-            <a:endParaRPr lang="en-US" dirty="0"/>
-          </a:p>
-          <a:p>
-            <a:pPr marL="0" indent="0">
-              <a:buNone/>
-            </a:pPr>
-            <a:r>
-              <a:rPr dirty="0"/>
-              <a:t>The class:</a:t>
-            </a:r>
-          </a:p>
-          <a:p>
-            <a:r>
-              <a:rPr dirty="0"/>
-              <a:t>Undergraduate and graduate students from several departments with varied backgrounds in math, statistics, computer programming, and ecology.</a:t>
-            </a:r>
-          </a:p>
-        </p:txBody>
-      </p:sp>
-    </p:spTree>
-  </p:cSld>
-  <p:clrMapOvr>
-    <a:masterClrMapping/>
-  </p:clrMapOvr>
-</p:sld>
-</file>
-
-<file path=ppt/slides/slide5.xml><?xml version="1.0" encoding="utf-8"?>
-<p:sld xmlns:a="http://schemas.openxmlformats.org/drawingml/2006/main" xmlns:r="http://schemas.openxmlformats.org/officeDocument/2006/relationships" xmlns:p="http://schemas.openxmlformats.org/presentationml/2006/main">
-  <p:cSld>
-    <p:spTree>
-      <p:nvGrpSpPr>
-        <p:cNvPr id="1" name=""/>
-        <p:cNvGrpSpPr/>
-        <p:nvPr/>
-      </p:nvGrpSpPr>
-      <p:grpSpPr>
-        <a:xfrm>
-          <a:off x="0" y="0"/>
-          <a:ext cx="0" cy="0"/>
-          <a:chOff x="0" y="0"/>
-          <a:chExt cx="0" cy="0"/>
-        </a:xfrm>
-      </p:grpSpPr>
-      <p:sp>
-        <p:nvSpPr>
-          <p:cNvPr id="2" name="Title 1"/>
-          <p:cNvSpPr>
-            <a:spLocks noGrp="1"/>
-          </p:cNvSpPr>
-          <p:nvPr>
-            <p:ph type="title"/>
-          </p:nvPr>
-        </p:nvSpPr>
-        <p:spPr/>
-        <p:txBody>
-          <a:bodyPr/>
-          <a:lstStyle/>
-          <a:p>
-            <a:r>
-              <a:t>Today’s Outline</a:t>
-            </a:r>
-          </a:p>
-        </p:txBody>
-      </p:sp>
-      <p:sp>
-        <p:nvSpPr>
-          <p:cNvPr id="3" name="Content Placeholder 2"/>
-          <p:cNvSpPr>
-            <a:spLocks noGrp="1"/>
-          </p:cNvSpPr>
-          <p:nvPr>
-            <p:ph idx="1"/>
-          </p:nvPr>
-        </p:nvSpPr>
-        <p:spPr/>
-        <p:txBody>
-          <a:bodyPr/>
-          <a:lstStyle/>
-          <a:p>
-            <a:pPr lvl="1">
-              <a:buAutoNum type="arabicPeriod"/>
-            </a:pPr>
-            <a:r>
-              <a:rPr lang="en-US" dirty="0"/>
-              <a:t> </a:t>
-            </a:r>
-            <a:r>
-              <a:rPr dirty="0"/>
-              <a:t>Logistics</a:t>
-            </a:r>
-          </a:p>
-          <a:p>
-            <a:pPr lvl="1">
-              <a:buAutoNum type="arabicPeriod"/>
-            </a:pPr>
-            <a:r>
-              <a:rPr lang="en-US" dirty="0"/>
-              <a:t> </a:t>
-            </a:r>
-            <a:r>
-              <a:rPr dirty="0"/>
-              <a:t>Probability</a:t>
-            </a:r>
-          </a:p>
-          <a:p>
-            <a:pPr lvl="1">
-              <a:buAutoNum type="arabicPeriod"/>
-            </a:pPr>
-            <a:r>
-              <a:rPr lang="en-US" dirty="0"/>
-              <a:t> </a:t>
-            </a:r>
-            <a:r>
-              <a:rPr dirty="0"/>
-              <a:t>Homework</a:t>
-            </a:r>
-          </a:p>
-        </p:txBody>
-      </p:sp>
-    </p:spTree>
-  </p:cSld>
-  <p:clrMapOvr>
-    <a:masterClrMapping/>
-  </p:clrMapOvr>
-</p:sld>
-</file>
-
-<file path=ppt/slides/slide6.xml><?xml version="1.0" encoding="utf-8"?>
-<p:sld xmlns:a="http://schemas.openxmlformats.org/drawingml/2006/main" xmlns:r="http://schemas.openxmlformats.org/officeDocument/2006/relationships" xmlns:p="http://schemas.openxmlformats.org/presentationml/2006/main">
-  <p:cSld>
-    <p:spTree>
-      <p:nvGrpSpPr>
-        <p:cNvPr id="1" name=""/>
-        <p:cNvGrpSpPr/>
-        <p:nvPr/>
-      </p:nvGrpSpPr>
-      <p:grpSpPr>
-        <a:xfrm>
-          <a:off x="0" y="0"/>
-          <a:ext cx="0" cy="0"/>
-          <a:chOff x="0" y="0"/>
-          <a:chExt cx="0" cy="0"/>
-        </a:xfrm>
-      </p:grpSpPr>
-      <p:sp>
-        <p:nvSpPr>
-          <p:cNvPr id="2" name="Title 1"/>
-          <p:cNvSpPr>
-            <a:spLocks noGrp="1"/>
-          </p:cNvSpPr>
-          <p:nvPr>
-            <p:ph type="title"/>
-          </p:nvPr>
-        </p:nvSpPr>
-        <p:spPr/>
-        <p:txBody>
-          <a:bodyPr/>
-          <a:lstStyle/>
-          <a:p>
-            <a:r>
-              <a:t>Logistics</a:t>
-            </a:r>
-          </a:p>
-        </p:txBody>
-      </p:sp>
-      <p:sp>
-        <p:nvSpPr>
-          <p:cNvPr id="3" name="Content Placeholder 2"/>
-          <p:cNvSpPr>
-            <a:spLocks noGrp="1"/>
-          </p:cNvSpPr>
-          <p:nvPr>
-            <p:ph idx="1"/>
-          </p:nvPr>
-        </p:nvSpPr>
-        <p:spPr/>
-        <p:txBody>
-          <a:bodyPr/>
-          <a:lstStyle/>
-          <a:p>
-            <a:pPr marL="0" indent="0">
-              <a:buNone/>
-            </a:pPr>
-            <a:r>
-              <a:rPr dirty="0"/>
-              <a:t>Take a look at the syllabus:</a:t>
-            </a:r>
-          </a:p>
-          <a:p>
-            <a:r>
-              <a:rPr dirty="0"/>
-              <a:t>General format (lectures mixed with computer exercises – find a partner or 2)</a:t>
-            </a:r>
-          </a:p>
-          <a:p>
-            <a:r>
-              <a:rPr dirty="0"/>
-              <a:t>Books: </a:t>
-            </a:r>
-            <a:r>
-              <a:rPr dirty="0" err="1"/>
-              <a:t>Bolker</a:t>
-            </a:r>
-            <a:r>
-              <a:rPr dirty="0"/>
-              <a:t>, R4DS</a:t>
-            </a:r>
-          </a:p>
-          <a:p>
-            <a:r>
-              <a:rPr dirty="0"/>
-              <a:t>Syllabus</a:t>
-            </a:r>
-          </a:p>
-          <a:p>
-            <a:r>
-              <a:rPr dirty="0"/>
-              <a:t>Access to laptops</a:t>
-            </a:r>
-          </a:p>
-          <a:p>
-            <a:r>
-              <a:rPr dirty="0"/>
-              <a:t>Lab</a:t>
-            </a:r>
-          </a:p>
-        </p:txBody>
-      </p:sp>
-    </p:spTree>
-  </p:cSld>
-  <p:clrMapOvr>
-    <a:masterClrMapping/>
-  </p:clrMapOvr>
-</p:sld>
-</file>
-
-<file path=ppt/slides/slide7.xml><?xml version="1.0" encoding="utf-8"?>
-<p:sld xmlns:a="http://schemas.openxmlformats.org/drawingml/2006/main" xmlns:r="http://schemas.openxmlformats.org/officeDocument/2006/relationships" xmlns:p="http://schemas.openxmlformats.org/presentationml/2006/main">
-  <p:cSld>
-    <p:spTree>
-      <p:nvGrpSpPr>
-        <p:cNvPr id="1" name=""/>
-        <p:cNvGrpSpPr/>
-        <p:nvPr/>
-      </p:nvGrpSpPr>
-      <p:grpSpPr>
-        <a:xfrm>
-          <a:off x="0" y="0"/>
-          <a:ext cx="0" cy="0"/>
-          <a:chOff x="0" y="0"/>
-          <a:chExt cx="0" cy="0"/>
-        </a:xfrm>
-      </p:grpSpPr>
-      <p:sp>
-        <p:nvSpPr>
-          <p:cNvPr id="2" name="Title 1"/>
-          <p:cNvSpPr>
-            <a:spLocks noGrp="1"/>
-          </p:cNvSpPr>
-          <p:nvPr>
-            <p:ph type="title"/>
-          </p:nvPr>
-        </p:nvSpPr>
-        <p:spPr/>
-        <p:txBody>
-          <a:bodyPr>
-            <a:normAutofit/>
-          </a:bodyPr>
-          <a:lstStyle/>
-          <a:p>
-            <a:r>
-              <a:t>Probability: textbook definition</a:t>
-            </a:r>
-          </a:p>
-        </p:txBody>
-      </p:sp>
-      <mc:AlternateContent xmlns:mc="http://schemas.openxmlformats.org/markup-compatibility/2006">
-        <mc:Choice xmlns:a14="http://schemas.microsoft.com/office/drawing/2010/main" Requires="a14">
-          <p:sp>
-            <p:nvSpPr>
-              <p:cNvPr id="3" name="Content Placeholder 2"/>
-              <p:cNvSpPr>
-                <a:spLocks noGrp="1"/>
-              </p:cNvSpPr>
-              <p:nvPr>
-                <p:ph idx="1"/>
-              </p:nvPr>
-            </p:nvSpPr>
-            <p:spPr/>
-            <p:txBody>
-              <a:bodyPr>
-                <a:normAutofit/>
-              </a:bodyPr>
-              <a:lstStyle/>
-              <a:p>
-                <a:pPr marL="0" indent="0">
-                  <a:buNone/>
-                </a:pPr>
-                <a:r>
-                  <a:rPr dirty="0"/>
-                  <a:t>“If an observation is made </a:t>
-                </a:r>
-                <a14:m>
-                  <m:oMath xmlns:m="http://schemas.openxmlformats.org/officeDocument/2006/math">
-                    <m:r>
-                      <a:rPr>
-                        <a:latin typeface="Cambria Math" panose="02040503050406030204" pitchFamily="18" charset="0"/>
-                      </a:rPr>
-                      <m:t>𝑁</m:t>
-                    </m:r>
-                  </m:oMath>
-                </a14:m>
-                <a:r>
-                  <a:rPr dirty="0"/>
-                  <a:t> times and event </a:t>
-                </a:r>
-                <a14:m>
-                  <m:oMath xmlns:m="http://schemas.openxmlformats.org/officeDocument/2006/math">
-                    <m:r>
-                      <a:rPr>
-                        <a:latin typeface="Cambria Math" panose="02040503050406030204" pitchFamily="18" charset="0"/>
-                      </a:rPr>
-                      <m:t>𝐴</m:t>
-                    </m:r>
-                  </m:oMath>
-                </a14:m>
-                <a:r>
-                  <a:rPr dirty="0"/>
-                  <a:t> occurs </a:t>
-                </a:r>
-                <a14:m>
-                  <m:oMath xmlns:m="http://schemas.openxmlformats.org/officeDocument/2006/math">
-                    <m:sSub>
-                      <m:sSubPr>
-                        <m:ctrlPr>
-                          <a:rPr>
-                            <a:latin typeface="Cambria Math" panose="02040503050406030204" pitchFamily="18" charset="0"/>
-                          </a:rPr>
-                        </m:ctrlPr>
-                      </m:sSubPr>
-                      <m:e>
-                        <m:r>
-                          <a:rPr>
-                            <a:latin typeface="Cambria Math" panose="02040503050406030204" pitchFamily="18" charset="0"/>
-                          </a:rPr>
-                          <m:t>𝑁</m:t>
-                        </m:r>
-                      </m:e>
-                      <m:sub>
-                        <m:r>
-                          <a:rPr>
-                            <a:latin typeface="Cambria Math" panose="02040503050406030204" pitchFamily="18" charset="0"/>
-                          </a:rPr>
-                          <m:t>𝐴</m:t>
-                        </m:r>
-                      </m:sub>
-                    </m:sSub>
-                  </m:oMath>
-                </a14:m>
-                <a:r>
-                  <a:rPr dirty="0"/>
-                  <a:t> times, then with a high degree of </a:t>
-                </a:r>
-                <a:r>
-                  <a:rPr b="1" dirty="0">
-                    <a:latin typeface="Avenir Next Demi Bold" panose="020B0503020202020204" pitchFamily="34" charset="0"/>
-                  </a:rPr>
-                  <a:t>certainty</a:t>
-                </a:r>
-                <a:r>
-                  <a:rPr dirty="0"/>
-                  <a:t>, the relative frequency of </a:t>
-                </a:r>
-                <a14:m>
-                  <m:oMath xmlns:m="http://schemas.openxmlformats.org/officeDocument/2006/math">
-                    <m:sSub>
-                      <m:sSubPr>
-                        <m:ctrlPr>
-                          <a:rPr>
-                            <a:latin typeface="Cambria Math" panose="02040503050406030204" pitchFamily="18" charset="0"/>
-                          </a:rPr>
-                        </m:ctrlPr>
-                      </m:sSubPr>
-                      <m:e>
-                        <m:r>
-                          <a:rPr>
-                            <a:latin typeface="Cambria Math" panose="02040503050406030204" pitchFamily="18" charset="0"/>
-                          </a:rPr>
-                          <m:t>𝑁</m:t>
-                        </m:r>
-                      </m:e>
-                      <m:sub>
-                        <m:r>
-                          <a:rPr>
-                            <a:latin typeface="Cambria Math" panose="02040503050406030204" pitchFamily="18" charset="0"/>
-                          </a:rPr>
-                          <m:t>𝐴</m:t>
-                        </m:r>
-                      </m:sub>
-                    </m:sSub>
-                    <m:r>
-                      <a:rPr>
-                        <a:latin typeface="Cambria Math" panose="02040503050406030204" pitchFamily="18" charset="0"/>
-                      </a:rPr>
-                      <m:t>/</m:t>
-                    </m:r>
-                    <m:r>
-                      <a:rPr>
-                        <a:latin typeface="Cambria Math" panose="02040503050406030204" pitchFamily="18" charset="0"/>
-                      </a:rPr>
-                      <m:t>𝑁</m:t>
-                    </m:r>
-                  </m:oMath>
-                </a14:m>
-                <a:r>
-                  <a:rPr dirty="0"/>
-                  <a:t> is </a:t>
-                </a:r>
-                <a:r>
-                  <a:rPr b="1" dirty="0">
-                    <a:latin typeface="Avenir Next Demi Bold" panose="020B0503020202020204" pitchFamily="34" charset="0"/>
-                  </a:rPr>
-                  <a:t>close</a:t>
-                </a:r>
-                <a:r>
-                  <a:rPr dirty="0"/>
-                  <a:t> to </a:t>
-                </a:r>
-                <a14:m>
-                  <m:oMath xmlns:m="http://schemas.openxmlformats.org/officeDocument/2006/math">
-                    <m:r>
-                      <a:rPr>
-                        <a:latin typeface="Cambria Math" panose="02040503050406030204" pitchFamily="18" charset="0"/>
-                      </a:rPr>
-                      <m:t>𝑃</m:t>
-                    </m:r>
-                    <m:r>
-                      <a:rPr>
-                        <a:latin typeface="Cambria Math" panose="02040503050406030204" pitchFamily="18" charset="0"/>
-                      </a:rPr>
-                      <m:t>(</m:t>
-                    </m:r>
-                    <m:r>
-                      <a:rPr>
-                        <a:latin typeface="Cambria Math" panose="02040503050406030204" pitchFamily="18" charset="0"/>
-                      </a:rPr>
-                      <m:t>𝐴</m:t>
-                    </m:r>
-                    <m:r>
-                      <a:rPr>
-                        <a:latin typeface="Cambria Math" panose="02040503050406030204" pitchFamily="18" charset="0"/>
-                      </a:rPr>
-                      <m:t>)</m:t>
-                    </m:r>
-                  </m:oMath>
-                </a14:m>
-                <a:r>
-                  <a:rPr dirty="0"/>
-                  <a:t>, the probability of </a:t>
-                </a:r>
-                <a14:m>
-                  <m:oMath xmlns:m="http://schemas.openxmlformats.org/officeDocument/2006/math">
-                    <m:r>
-                      <a:rPr>
-                        <a:latin typeface="Cambria Math" panose="02040503050406030204" pitchFamily="18" charset="0"/>
-                      </a:rPr>
-                      <m:t>𝐴</m:t>
-                    </m:r>
-                  </m:oMath>
-                </a14:m>
-                <a:r>
-                  <a:rPr dirty="0"/>
-                  <a:t> in a single trial, </a:t>
-                </a:r>
-                <a14:m>
-                  <m:oMath xmlns:m="http://schemas.openxmlformats.org/officeDocument/2006/math">
-                    <m:r>
-                      <a:rPr>
-                        <a:latin typeface="Cambria Math" panose="02040503050406030204" pitchFamily="18" charset="0"/>
-                      </a:rPr>
-                      <m:t>𝑃</m:t>
-                    </m:r>
-                    <m:r>
-                      <a:rPr>
-                        <a:latin typeface="Cambria Math" panose="02040503050406030204" pitchFamily="18" charset="0"/>
-                      </a:rPr>
-                      <m:t>(</m:t>
-                    </m:r>
-                    <m:r>
-                      <a:rPr>
-                        <a:latin typeface="Cambria Math" panose="02040503050406030204" pitchFamily="18" charset="0"/>
-                      </a:rPr>
-                      <m:t>𝐴</m:t>
-                    </m:r>
-                    <m:r>
-                      <a:rPr>
-                        <a:latin typeface="Cambria Math" panose="02040503050406030204" pitchFamily="18" charset="0"/>
-                      </a:rPr>
-                      <m:t>)≈</m:t>
-                    </m:r>
-                    <m:sSub>
-                      <m:sSubPr>
-                        <m:ctrlPr>
-                          <a:rPr i="1">
-                            <a:latin typeface="Cambria Math" panose="02040503050406030204" pitchFamily="18" charset="0"/>
-                          </a:rPr>
-                        </m:ctrlPr>
-                      </m:sSubPr>
-                      <m:e>
-                        <m:r>
-                          <a:rPr>
-                            <a:latin typeface="Cambria Math" panose="02040503050406030204" pitchFamily="18" charset="0"/>
-                          </a:rPr>
-                          <m:t>𝑁</m:t>
-                        </m:r>
-                      </m:e>
-                      <m:sub>
-                        <m:r>
-                          <a:rPr>
-                            <a:latin typeface="Cambria Math" panose="02040503050406030204" pitchFamily="18" charset="0"/>
-                          </a:rPr>
-                          <m:t>𝐴</m:t>
-                        </m:r>
-                      </m:sub>
-                    </m:sSub>
-                    <m:r>
-                      <a:rPr>
-                        <a:latin typeface="Cambria Math" panose="02040503050406030204" pitchFamily="18" charset="0"/>
-                      </a:rPr>
-                      <m:t>/</m:t>
-                    </m:r>
-                    <m:r>
-                      <a:rPr>
-                        <a:latin typeface="Cambria Math" panose="02040503050406030204" pitchFamily="18" charset="0"/>
-                      </a:rPr>
-                      <m:t>𝑁</m:t>
-                    </m:r>
-                  </m:oMath>
-                </a14:m>
-                <a:r>
-                  <a:rPr dirty="0"/>
-                  <a:t>, provided </a:t>
-                </a:r>
-                <a14:m>
-                  <m:oMath xmlns:m="http://schemas.openxmlformats.org/officeDocument/2006/math">
-                    <m:r>
-                      <a:rPr>
-                        <a:latin typeface="Cambria Math" panose="02040503050406030204" pitchFamily="18" charset="0"/>
-                      </a:rPr>
-                      <m:t>𝑁</m:t>
-                    </m:r>
-                  </m:oMath>
-                </a14:m>
-                <a:r>
-                  <a:rPr dirty="0"/>
-                  <a:t> is </a:t>
-                </a:r>
-                <a:r>
-                  <a:rPr b="1" dirty="0">
-                    <a:latin typeface="Avenir Next Demi Bold" panose="020B0503020202020204" pitchFamily="34" charset="0"/>
-                  </a:rPr>
-                  <a:t>sufficiently large</a:t>
-                </a:r>
-                <a:r>
-                  <a:rPr dirty="0"/>
-                  <a:t>.”</a:t>
-                </a:r>
-              </a:p>
-              <a:p>
-                <a:pPr marL="0" indent="0">
-                  <a:buNone/>
-                </a:pPr>
-                <a:r>
-                  <a:rPr dirty="0"/>
-                  <a:t>Mathematical restatement:</a:t>
-                </a:r>
-              </a:p>
-              <a:p>
-                <a:pPr marL="0" indent="0">
-                  <a:buNone/>
-                </a:pPr>
-                <a14:m>
-                  <m:oMathPara xmlns:m="http://schemas.openxmlformats.org/officeDocument/2006/math">
-                    <m:oMathParaPr>
-                      <m:jc m:val="center"/>
-                    </m:oMathParaPr>
-                    <m:oMath xmlns:m="http://schemas.openxmlformats.org/officeDocument/2006/math">
-                      <m:r>
-                        <a:rPr>
-                          <a:latin typeface="Cambria Math" panose="02040503050406030204" pitchFamily="18" charset="0"/>
-                        </a:rPr>
-                        <m:t>𝑃</m:t>
-                      </m:r>
-                      <m:r>
-                        <a:rPr>
-                          <a:latin typeface="Cambria Math" panose="02040503050406030204" pitchFamily="18" charset="0"/>
-                        </a:rPr>
-                        <m:t>(</m:t>
-                      </m:r>
-                      <m:r>
-                        <a:rPr>
-                          <a:latin typeface="Cambria Math" panose="02040503050406030204" pitchFamily="18" charset="0"/>
-                        </a:rPr>
-                        <m:t>𝐴</m:t>
-                      </m:r>
-                      <m:r>
-                        <a:rPr>
-                          <a:latin typeface="Cambria Math" panose="02040503050406030204" pitchFamily="18" charset="0"/>
-                        </a:rPr>
-                        <m:t>)=</m:t>
-                      </m:r>
-                      <m:limLow>
-                        <m:limLowPr>
-                          <m:ctrlPr>
-                            <a:rPr i="1">
-                              <a:latin typeface="Cambria Math" panose="02040503050406030204" pitchFamily="18" charset="0"/>
-                            </a:rPr>
-                          </m:ctrlPr>
-                        </m:limLowPr>
-                        <m:e>
-                          <m:r>
-                            <m:rPr>
-                              <m:sty m:val="p"/>
-                            </m:rPr>
-                            <a:rPr>
-                              <a:latin typeface="Cambria Math" panose="02040503050406030204" pitchFamily="18" charset="0"/>
-                            </a:rPr>
-                            <m:t>lim</m:t>
-                          </m:r>
-                        </m:e>
-                        <m:lim>
-                          <m:r>
-                            <a:rPr>
-                              <a:latin typeface="Cambria Math" panose="02040503050406030204" pitchFamily="18" charset="0"/>
-                            </a:rPr>
-                            <m:t>𝑁</m:t>
-                          </m:r>
-                          <m:r>
-                            <a:rPr>
-                              <a:latin typeface="Cambria Math" panose="02040503050406030204" pitchFamily="18" charset="0"/>
-                            </a:rPr>
-                            <m:t>→∞</m:t>
-                          </m:r>
-                        </m:lim>
-                      </m:limLow>
-                      <m:d>
-                        <m:dPr>
-                          <m:ctrlPr>
-                            <a:rPr i="1">
-                              <a:latin typeface="Cambria Math" panose="02040503050406030204" pitchFamily="18" charset="0"/>
-                            </a:rPr>
-                          </m:ctrlPr>
-                        </m:dPr>
-                        <m:e>
-                          <m:f>
-                            <m:fPr>
-                              <m:ctrlPr>
-                                <a:rPr i="1">
-                                  <a:latin typeface="Cambria Math" panose="02040503050406030204" pitchFamily="18" charset="0"/>
-                                </a:rPr>
-                              </m:ctrlPr>
-                            </m:fPr>
-                            <m:num>
-                              <m:sSub>
-                                <m:sSubPr>
-                                  <m:ctrlPr>
-                                    <a:rPr i="1">
-                                      <a:latin typeface="Cambria Math" panose="02040503050406030204" pitchFamily="18" charset="0"/>
-                                    </a:rPr>
-                                  </m:ctrlPr>
-                                </m:sSubPr>
-                                <m:e>
-                                  <m:r>
-                                    <a:rPr>
-                                      <a:latin typeface="Cambria Math" panose="02040503050406030204" pitchFamily="18" charset="0"/>
-                                    </a:rPr>
-                                    <m:t>𝑁</m:t>
-                                  </m:r>
-                                </m:e>
-                                <m:sub>
-                                  <m:r>
-                                    <a:rPr>
-                                      <a:latin typeface="Cambria Math" panose="02040503050406030204" pitchFamily="18" charset="0"/>
-                                    </a:rPr>
-                                    <m:t>𝐴</m:t>
-                                  </m:r>
-                                </m:sub>
-                              </m:sSub>
-                            </m:num>
-                            <m:den>
-                              <m:r>
-                                <a:rPr>
-                                  <a:latin typeface="Cambria Math" panose="02040503050406030204" pitchFamily="18" charset="0"/>
-                                </a:rPr>
-                                <m:t>𝑁</m:t>
-                              </m:r>
-                            </m:den>
-                          </m:f>
-                        </m:e>
-                      </m:d>
-                    </m:oMath>
-                  </m:oMathPara>
-                </a14:m>
-                <a:endParaRPr dirty="0"/>
-              </a:p>
-            </p:txBody>
-          </p:sp>
-        </mc:Choice>
-        <mc:Fallback>
-          <p:sp>
-            <p:nvSpPr>
-              <p:cNvPr id="3" name="Content Placeholder 2"/>
-              <p:cNvSpPr>
-                <a:spLocks noGrp="1" noRot="1" noChangeAspect="1" noMove="1" noResize="1" noEditPoints="1" noAdjustHandles="1" noChangeArrowheads="1" noChangeShapeType="1" noTextEdit="1"/>
-              </p:cNvSpPr>
-              <p:nvPr>
-                <p:ph idx="1"/>
-              </p:nvPr>
-            </p:nvSpPr>
-            <p:spPr>
-              <a:blipFill>
-                <a:blip r:embed="rId2"/>
-                <a:stretch>
-                  <a:fillRect l="-926" t="-840"/>
-                </a:stretch>
-              </a:blipFill>
-            </p:spPr>
-            <p:txBody>
-              <a:bodyPr/>
-              <a:lstStyle/>
-              <a:p>
-                <a:r>
-                  <a:rPr lang="en-US">
-                    <a:noFill/>
-                  </a:rPr>
-                  <a:t> </a:t>
-                </a:r>
-              </a:p>
-            </p:txBody>
-          </p:sp>
-        </mc:Fallback>
-      </mc:AlternateContent>
-    </p:spTree>
-  </p:cSld>
-  <p:clrMapOvr>
-    <a:masterClrMapping/>
-  </p:clrMapOvr>
-</p:sld>
-</file>
-
-<file path=ppt/slides/slide8.xml><?xml version="1.0" encoding="utf-8"?>
-<p:sld xmlns:a="http://schemas.openxmlformats.org/drawingml/2006/main" xmlns:r="http://schemas.openxmlformats.org/officeDocument/2006/relationships" xmlns:p="http://schemas.openxmlformats.org/presentationml/2006/main">
-  <p:cSld>
-    <p:spTree>
-      <p:nvGrpSpPr>
-        <p:cNvPr id="1" name=""/>
-        <p:cNvGrpSpPr/>
-        <p:nvPr/>
-      </p:nvGrpSpPr>
-      <p:grpSpPr>
-        <a:xfrm>
-          <a:off x="0" y="0"/>
-          <a:ext cx="0" cy="0"/>
-          <a:chOff x="0" y="0"/>
-          <a:chExt cx="0" cy="0"/>
-        </a:xfrm>
-      </p:grpSpPr>
-      <p:sp>
-        <p:nvSpPr>
-          <p:cNvPr id="2" name="Title 1"/>
-          <p:cNvSpPr>
-            <a:spLocks noGrp="1"/>
-          </p:cNvSpPr>
-          <p:nvPr>
-            <p:ph type="title"/>
-          </p:nvPr>
-        </p:nvSpPr>
-        <p:spPr/>
-        <p:txBody>
-          <a:bodyPr/>
-          <a:lstStyle/>
-          <a:p>
-            <a:r>
-              <a:t>Example application</a:t>
-            </a:r>
-          </a:p>
-        </p:txBody>
-      </p:sp>
-      <p:sp>
-        <p:nvSpPr>
-          <p:cNvPr id="3" name="Content Placeholder 2"/>
-          <p:cNvSpPr>
-            <a:spLocks noGrp="1"/>
-          </p:cNvSpPr>
-          <p:nvPr>
-            <p:ph idx="1"/>
-          </p:nvPr>
-        </p:nvSpPr>
-        <p:spPr/>
-        <p:txBody>
-          <a:bodyPr>
-            <a:normAutofit/>
-          </a:bodyPr>
-          <a:lstStyle/>
-          <a:p>
-            <a:pPr marL="0" indent="0">
-              <a:buNone/>
-            </a:pPr>
-            <a:r>
-              <a:rPr dirty="0"/>
-              <a:t>Common ecological application: survival and reproduction of perennial wildflowers</a:t>
-            </a:r>
-            <a:endParaRPr lang="en-US" dirty="0"/>
-          </a:p>
-          <a:p>
-            <a:r>
-              <a:rPr dirty="0"/>
-              <a:t>Mark individual plants and watch their performance over time.</a:t>
-            </a:r>
-          </a:p>
-          <a:p>
-            <a:r>
-              <a:rPr dirty="0"/>
-              <a:t>What is the probability that a plant will survive from one year to the next?</a:t>
-            </a:r>
-          </a:p>
-          <a:p>
-            <a:r>
-              <a:rPr dirty="0"/>
-              <a:t>What is the probability that a plant that survives will flower?</a:t>
-            </a:r>
-          </a:p>
-        </p:txBody>
-      </p:sp>
-    </p:spTree>
-  </p:cSld>
-  <p:clrMapOvr>
-    <a:masterClrMapping/>
-  </p:clrMapOvr>
-</p:sld>
-</file>
-
-<file path=ppt/slides/slide9.xml><?xml version="1.0" encoding="utf-8"?>
-<p:sld xmlns:a="http://schemas.openxmlformats.org/drawingml/2006/main" xmlns:r="http://schemas.openxmlformats.org/officeDocument/2006/relationships" xmlns:p="http://schemas.openxmlformats.org/presentationml/2006/main">
-  <p:cSld>
-    <p:spTree>
-      <p:nvGrpSpPr>
-        <p:cNvPr id="1" name=""/>
-        <p:cNvGrpSpPr/>
-        <p:nvPr/>
-      </p:nvGrpSpPr>
-      <p:grpSpPr>
-        <a:xfrm>
-          <a:off x="0" y="0"/>
-          <a:ext cx="0" cy="0"/>
-          <a:chOff x="0" y="0"/>
-          <a:chExt cx="0" cy="0"/>
-        </a:xfrm>
-      </p:grpSpPr>
-      <p:sp>
-        <p:nvSpPr>
-          <p:cNvPr id="2" name="Title 1"/>
-          <p:cNvSpPr>
-            <a:spLocks noGrp="1"/>
-          </p:cNvSpPr>
-          <p:nvPr>
-            <p:ph type="title"/>
-          </p:nvPr>
-        </p:nvSpPr>
-        <p:spPr/>
-        <p:txBody>
-          <a:bodyPr/>
-          <a:lstStyle/>
-          <a:p>
-            <a:r>
-              <a:t>Example application</a:t>
-            </a:r>
-          </a:p>
-        </p:txBody>
-      </p:sp>
-      <p:sp>
-        <p:nvSpPr>
-          <p:cNvPr id="3" name="Content Placeholder 2"/>
-          <p:cNvSpPr>
-            <a:spLocks noGrp="1"/>
-          </p:cNvSpPr>
-          <p:nvPr>
-            <p:ph idx="1"/>
-          </p:nvPr>
-        </p:nvSpPr>
-        <p:spPr/>
-        <p:txBody>
-          <a:bodyPr/>
-          <a:lstStyle/>
-          <a:p>
-            <a:pPr marL="0" indent="0">
-              <a:buNone/>
-            </a:pPr>
-            <a:r>
-              <a:rPr lang="en-US" i="1" dirty="0"/>
-              <a:t>For a particular dataset</a:t>
-            </a:r>
-            <a:r>
-              <a:rPr dirty="0"/>
-              <a:t>, we can use the definition of probability to estimate these probabilities (“provided N is </a:t>
-            </a:r>
-            <a:r>
-              <a:rPr b="1" dirty="0">
-                <a:latin typeface="Avenir Next Demi Bold" panose="020B0503020202020204" pitchFamily="34" charset="0"/>
-              </a:rPr>
-              <a:t>sufficiently large</a:t>
-            </a:r>
-            <a:r>
-              <a:rPr dirty="0"/>
-              <a:t>”)</a:t>
-            </a:r>
-          </a:p>
-          <a:p>
-            <a:pPr marL="0" indent="0">
-              <a:buNone/>
-            </a:pPr>
-            <a:r>
-              <a:rPr dirty="0"/>
-              <a:t>Say we have 5 plants, 4 live, and 1 of these flower</a:t>
-            </a:r>
-          </a:p>
-        </p:txBody>
-      </p:sp>
-      <p:graphicFrame>
-        <p:nvGraphicFramePr>
-          <p:cNvPr id="4" name="Content Placeholder 5">
-            <a:extLst>
-              <a:ext uri="{FF2B5EF4-FFF2-40B4-BE49-F238E27FC236}">
-                <a16:creationId xmlns:a16="http://schemas.microsoft.com/office/drawing/2014/main" id="{7E016B24-BB85-B54C-A4CB-CF27EDF8DB90}"/>
-              </a:ext>
-            </a:extLst>
-          </p:cNvPr>
-          <p:cNvGraphicFramePr>
-            <a:graphicFrameLocks/>
-          </p:cNvGraphicFramePr>
-          <p:nvPr>
-            <p:extLst>
-              <p:ext uri="{D42A27DB-BD31-4B8C-83A1-F6EECF244321}">
-                <p14:modId xmlns:p14="http://schemas.microsoft.com/office/powerpoint/2010/main" val="3102504609"/>
-              </p:ext>
-            </p:extLst>
-          </p:nvPr>
-        </p:nvGraphicFramePr>
-        <p:xfrm>
-          <a:off x="896112" y="3931604"/>
-          <a:ext cx="2407920" cy="2194560"/>
-        </p:xfrm>
-        <a:graphic>
-          <a:graphicData uri="http://schemas.openxmlformats.org/drawingml/2006/table">
-            <a:tbl>
-              <a:tblPr firstRow="1" bandRow="1">
-                <a:tableStyleId>{5940675A-B579-460E-94D1-54222C63F5DA}</a:tableStyleId>
-              </a:tblPr>
-              <a:tblGrid>
-                <a:gridCol w="1018032">
-                  <a:extLst>
-                    <a:ext uri="{9D8B030D-6E8A-4147-A177-3AD203B41FA5}">
-                      <a16:colId xmlns:a16="http://schemas.microsoft.com/office/drawing/2014/main" val="20000"/>
-                    </a:ext>
-                  </a:extLst>
-                </a:gridCol>
-                <a:gridCol w="1389888">
-                  <a:extLst>
-                    <a:ext uri="{9D8B030D-6E8A-4147-A177-3AD203B41FA5}">
-                      <a16:colId xmlns:a16="http://schemas.microsoft.com/office/drawing/2014/main" val="20001"/>
-                    </a:ext>
-                  </a:extLst>
-                </a:gridCol>
-              </a:tblGrid>
-              <a:tr h="0">
-                <a:tc>
-                  <a:txBody>
-                    <a:bodyPr/>
-                    <a:lstStyle/>
-                    <a:p>
-                      <a:pPr marL="0" lvl="0" indent="0" algn="r">
-                        <a:buNone/>
-                      </a:pPr>
-                      <a:r>
-                        <a:rPr dirty="0"/>
-                        <a:t>Plant #</a:t>
-                      </a:r>
-                    </a:p>
-                  </a:txBody>
-                  <a:tcPr/>
-                </a:tc>
-                <a:tc>
-                  <a:txBody>
-                    <a:bodyPr/>
-                    <a:lstStyle/>
-                    <a:p>
-                      <a:pPr marL="0" lvl="0" indent="0" algn="r">
-                        <a:buNone/>
-                      </a:pPr>
-                      <a:r>
-                        <a:rPr dirty="0"/>
-                        <a:t>fate</a:t>
-                      </a:r>
-                    </a:p>
-                  </a:txBody>
-                  <a:tcPr/>
-                </a:tc>
-                <a:extLst>
-                  <a:ext uri="{0D108BD9-81ED-4DB2-BD59-A6C34878D82A}">
-                    <a16:rowId xmlns:a16="http://schemas.microsoft.com/office/drawing/2014/main" val="10000"/>
-                  </a:ext>
-                </a:extLst>
-              </a:tr>
-              <a:tr h="0">
-                <a:tc>
-                  <a:txBody>
-                    <a:bodyPr/>
-                    <a:lstStyle/>
-                    <a:p>
-                      <a:pPr marL="0" lvl="0" indent="0" algn="r">
-                        <a:buNone/>
-                      </a:pPr>
-                      <a:r>
-                        <a:rPr dirty="0"/>
-                        <a:t>1</a:t>
-                      </a:r>
-                    </a:p>
-                  </a:txBody>
-                  <a:tcPr/>
-                </a:tc>
-                <a:tc>
-                  <a:txBody>
-                    <a:bodyPr/>
-                    <a:lstStyle/>
-                    <a:p>
-                      <a:pPr marL="0" lvl="0" indent="0" algn="r">
-                        <a:buNone/>
-                      </a:pPr>
-                      <a:r>
-                        <a:t>Flowers</a:t>
-                      </a:r>
-                    </a:p>
-                  </a:txBody>
-                  <a:tcPr/>
-                </a:tc>
-                <a:extLst>
-                  <a:ext uri="{0D108BD9-81ED-4DB2-BD59-A6C34878D82A}">
-                    <a16:rowId xmlns:a16="http://schemas.microsoft.com/office/drawing/2014/main" val="10001"/>
-                  </a:ext>
-                </a:extLst>
-              </a:tr>
-              <a:tr h="0">
-                <a:tc>
-                  <a:txBody>
-                    <a:bodyPr/>
-                    <a:lstStyle/>
-                    <a:p>
-                      <a:pPr marL="0" lvl="0" indent="0" algn="r">
-                        <a:buNone/>
-                      </a:pPr>
-                      <a:r>
-                        <a:t>2</a:t>
-                      </a:r>
-                    </a:p>
-                  </a:txBody>
-                  <a:tcPr/>
-                </a:tc>
-                <a:tc>
-                  <a:txBody>
-                    <a:bodyPr/>
-                    <a:lstStyle/>
-                    <a:p>
-                      <a:pPr marL="0" lvl="0" indent="0" algn="r">
-                        <a:buNone/>
-                      </a:pPr>
-                      <a:r>
-                        <a:t>Vegetative</a:t>
-                      </a:r>
-                    </a:p>
-                  </a:txBody>
-                  <a:tcPr/>
-                </a:tc>
-                <a:extLst>
-                  <a:ext uri="{0D108BD9-81ED-4DB2-BD59-A6C34878D82A}">
-                    <a16:rowId xmlns:a16="http://schemas.microsoft.com/office/drawing/2014/main" val="10002"/>
-                  </a:ext>
-                </a:extLst>
-              </a:tr>
-              <a:tr h="0">
-                <a:tc>
-                  <a:txBody>
-                    <a:bodyPr/>
-                    <a:lstStyle/>
-                    <a:p>
-                      <a:pPr marL="0" lvl="0" indent="0" algn="r">
-                        <a:buNone/>
-                      </a:pPr>
-                      <a:r>
-                        <a:t>3</a:t>
-                      </a:r>
-                    </a:p>
-                  </a:txBody>
-                  <a:tcPr/>
-                </a:tc>
-                <a:tc>
-                  <a:txBody>
-                    <a:bodyPr/>
-                    <a:lstStyle/>
-                    <a:p>
-                      <a:pPr marL="0" lvl="0" indent="0" algn="r">
-                        <a:buNone/>
-                      </a:pPr>
-                      <a:r>
-                        <a:t>Vegetative</a:t>
-                      </a:r>
-                    </a:p>
-                  </a:txBody>
-                  <a:tcPr/>
-                </a:tc>
-                <a:extLst>
-                  <a:ext uri="{0D108BD9-81ED-4DB2-BD59-A6C34878D82A}">
-                    <a16:rowId xmlns:a16="http://schemas.microsoft.com/office/drawing/2014/main" val="10003"/>
-                  </a:ext>
-                </a:extLst>
-              </a:tr>
-              <a:tr h="0">
-                <a:tc>
-                  <a:txBody>
-                    <a:bodyPr/>
-                    <a:lstStyle/>
-                    <a:p>
-                      <a:pPr marL="0" lvl="0" indent="0" algn="r">
-                        <a:buNone/>
-                      </a:pPr>
-                      <a:r>
-                        <a:t>4</a:t>
-                      </a:r>
-                    </a:p>
-                  </a:txBody>
-                  <a:tcPr/>
-                </a:tc>
-                <a:tc>
-                  <a:txBody>
-                    <a:bodyPr/>
-                    <a:lstStyle/>
-                    <a:p>
-                      <a:pPr marL="0" lvl="0" indent="0" algn="r">
-                        <a:buNone/>
-                      </a:pPr>
-                      <a:r>
-                        <a:t>Vegetative</a:t>
-                      </a:r>
-                    </a:p>
-                  </a:txBody>
-                  <a:tcPr/>
-                </a:tc>
-                <a:extLst>
-                  <a:ext uri="{0D108BD9-81ED-4DB2-BD59-A6C34878D82A}">
-                    <a16:rowId xmlns:a16="http://schemas.microsoft.com/office/drawing/2014/main" val="10004"/>
-                  </a:ext>
-                </a:extLst>
-              </a:tr>
-              <a:tr h="0">
-                <a:tc>
-                  <a:txBody>
-                    <a:bodyPr/>
-                    <a:lstStyle/>
-                    <a:p>
-                      <a:pPr marL="0" lvl="0" indent="0" algn="r">
-                        <a:buNone/>
-                      </a:pPr>
-                      <a:r>
-                        <a:t>5</a:t>
-                      </a:r>
-                    </a:p>
-                  </a:txBody>
-                  <a:tcPr/>
-                </a:tc>
-                <a:tc>
-                  <a:txBody>
-                    <a:bodyPr/>
-                    <a:lstStyle/>
-                    <a:p>
-                      <a:pPr marL="0" lvl="0" indent="0" algn="r">
-                        <a:buNone/>
-                      </a:pPr>
-                      <a:r>
-                        <a:rPr dirty="0"/>
-                        <a:t>Dead</a:t>
-                      </a:r>
-                    </a:p>
-                  </a:txBody>
-                  <a:tcPr/>
-                </a:tc>
-                <a:extLst>
-                  <a:ext uri="{0D108BD9-81ED-4DB2-BD59-A6C34878D82A}">
-                    <a16:rowId xmlns:a16="http://schemas.microsoft.com/office/drawing/2014/main" val="10005"/>
-                  </a:ext>
-                </a:extLst>
-              </a:tr>
-            </a:tbl>
-          </a:graphicData>
-        </a:graphic>
-      </p:graphicFrame>
-      <mc:AlternateContent xmlns:mc="http://schemas.openxmlformats.org/markup-compatibility/2006">
-        <mc:Choice xmlns:a14="http://schemas.microsoft.com/office/drawing/2010/main" Requires="a14">
-          <p:sp>
-            <p:nvSpPr>
-              <p:cNvPr id="6" name="Rectangle 5">
-                <a:extLst>
-                  <a:ext uri="{FF2B5EF4-FFF2-40B4-BE49-F238E27FC236}">
-                    <a16:creationId xmlns:a16="http://schemas.microsoft.com/office/drawing/2014/main" id="{6C34C057-576B-E342-B07E-CB8583D26FFC}"/>
-                  </a:ext>
-                </a:extLst>
-              </p:cNvPr>
-              <p:cNvSpPr/>
-              <p:nvPr/>
-            </p:nvSpPr>
-            <p:spPr>
-              <a:xfrm>
-                <a:off x="3590544" y="3931604"/>
-                <a:ext cx="6492240" cy="2015936"/>
-              </a:xfrm>
-              <a:prstGeom prst="rect">
-                <a:avLst/>
-              </a:prstGeom>
-            </p:spPr>
-            <p:txBody>
-              <a:bodyPr wrap="square">
-                <a:spAutoFit/>
-              </a:bodyPr>
-              <a:lstStyle/>
-              <a:p>
-                <a14:m>
-                  <m:oMath xmlns:m="http://schemas.openxmlformats.org/officeDocument/2006/math">
-                    <m:r>
-                      <a:rPr lang="en-US" sz="2500">
-                        <a:latin typeface="Cambria Math" panose="02040503050406030204" pitchFamily="18" charset="0"/>
-                      </a:rPr>
-                      <m:t>𝑁</m:t>
-                    </m:r>
-                  </m:oMath>
-                </a14:m>
-                <a:r>
-                  <a:rPr lang="en-US" sz="2500" dirty="0"/>
-                  <a:t> = total # trials </a:t>
-                </a:r>
-                <a14:m>
-                  <m:oMath xmlns:m="http://schemas.openxmlformats.org/officeDocument/2006/math">
-                    <m:sSub>
-                      <m:sSubPr>
-                        <m:ctrlPr>
-                          <a:rPr lang="ar-AE" sz="2500" i="1">
-                            <a:latin typeface="Cambria Math" panose="02040503050406030204" pitchFamily="18" charset="0"/>
-                          </a:rPr>
-                        </m:ctrlPr>
-                      </m:sSubPr>
-                      <m:e>
-                        <m:r>
-                          <a:rPr lang="ar-AE" sz="2500">
-                            <a:latin typeface="Cambria Math" panose="02040503050406030204" pitchFamily="18" charset="0"/>
-                          </a:rPr>
-                          <m:t>𝑁</m:t>
-                        </m:r>
-                      </m:e>
-                      <m:sub>
-                        <m:r>
-                          <a:rPr lang="ar-AE" sz="2500">
-                            <a:latin typeface="Cambria Math" panose="02040503050406030204" pitchFamily="18" charset="0"/>
-                          </a:rPr>
-                          <m:t>𝐴</m:t>
-                        </m:r>
-                      </m:sub>
-                    </m:sSub>
-                  </m:oMath>
-                </a14:m>
-                <a:r>
-                  <a:rPr lang="ar-AE" sz="2500" dirty="0"/>
-                  <a:t> = </a:t>
-                </a:r>
-                <a:r>
-                  <a:rPr lang="en-US" sz="2500" dirty="0"/>
-                  <a:t>number of times </a:t>
-                </a:r>
-                <a14:m>
-                  <m:oMath xmlns:m="http://schemas.openxmlformats.org/officeDocument/2006/math">
-                    <m:r>
-                      <a:rPr lang="en-US" sz="2500">
-                        <a:latin typeface="Cambria Math" panose="02040503050406030204" pitchFamily="18" charset="0"/>
-                      </a:rPr>
-                      <m:t>𝐴</m:t>
-                    </m:r>
-                  </m:oMath>
-                </a14:m>
-                <a:r>
-                  <a:rPr lang="en-US" sz="2500" dirty="0"/>
-                  <a:t> occurs</a:t>
-                </a:r>
-              </a:p>
-              <a:p>
-                <a:r>
-                  <a:rPr lang="en-US" sz="2500" dirty="0"/>
-                  <a:t>Survival:</a:t>
-                </a:r>
-              </a:p>
-              <a:p>
-                <a:pPr lvl="1"/>
-                <a:r>
-                  <a:rPr lang="en-US" sz="2500" dirty="0"/>
-                  <a:t>What is </a:t>
-                </a:r>
-                <a14:m>
-                  <m:oMath xmlns:m="http://schemas.openxmlformats.org/officeDocument/2006/math">
-                    <m:r>
-                      <a:rPr lang="en-US" sz="2500">
-                        <a:latin typeface="Cambria Math" panose="02040503050406030204" pitchFamily="18" charset="0"/>
-                      </a:rPr>
-                      <m:t>𝑁</m:t>
-                    </m:r>
-                  </m:oMath>
-                </a14:m>
-                <a:r>
-                  <a:rPr lang="en-US" sz="2500" dirty="0"/>
-                  <a:t>?</a:t>
-                </a:r>
-              </a:p>
-              <a:p>
-                <a:pPr lvl="1"/>
-                <a:r>
-                  <a:rPr lang="en-US" sz="2500" dirty="0"/>
-                  <a:t>What is </a:t>
-                </a:r>
-                <a14:m>
-                  <m:oMath xmlns:m="http://schemas.openxmlformats.org/officeDocument/2006/math">
-                    <m:sSub>
-                      <m:sSubPr>
-                        <m:ctrlPr>
-                          <a:rPr lang="ar-AE" sz="2500" i="1">
-                            <a:latin typeface="Cambria Math" panose="02040503050406030204" pitchFamily="18" charset="0"/>
-                          </a:rPr>
-                        </m:ctrlPr>
-                      </m:sSubPr>
-                      <m:e>
-                        <m:r>
-                          <a:rPr lang="ar-AE" sz="2500">
-                            <a:latin typeface="Cambria Math" panose="02040503050406030204" pitchFamily="18" charset="0"/>
-                          </a:rPr>
-                          <m:t>𝑁</m:t>
-                        </m:r>
-                      </m:e>
-                      <m:sub>
-                        <m:r>
-                          <a:rPr lang="ar-AE" sz="2500">
-                            <a:latin typeface="Cambria Math" panose="02040503050406030204" pitchFamily="18" charset="0"/>
-                          </a:rPr>
-                          <m:t>𝐴</m:t>
-                        </m:r>
-                      </m:sub>
-                    </m:sSub>
-                  </m:oMath>
-                </a14:m>
-                <a:r>
-                  <a:rPr lang="ar-AE" sz="2500" dirty="0"/>
-                  <a:t>?</a:t>
-                </a:r>
-              </a:p>
-              <a:p>
-                <a:pPr lvl="1"/>
-                <a:r>
-                  <a:rPr lang="en-US" sz="2500" dirty="0"/>
-                  <a:t>What is </a:t>
-                </a:r>
-                <a14:m>
-                  <m:oMath xmlns:m="http://schemas.openxmlformats.org/officeDocument/2006/math">
-                    <m:r>
-                      <a:rPr lang="en-US" sz="2500">
-                        <a:latin typeface="Cambria Math" panose="02040503050406030204" pitchFamily="18" charset="0"/>
-                      </a:rPr>
-                      <m:t>𝑃</m:t>
-                    </m:r>
-                    <m:r>
-                      <a:rPr lang="en-US" sz="2500">
-                        <a:latin typeface="Cambria Math" panose="02040503050406030204" pitchFamily="18" charset="0"/>
-                      </a:rPr>
-                      <m:t>(</m:t>
-                    </m:r>
-                    <m:r>
-                      <a:rPr lang="en-US" sz="2500">
-                        <a:latin typeface="Cambria Math" panose="02040503050406030204" pitchFamily="18" charset="0"/>
-                      </a:rPr>
-                      <m:t>𝐴</m:t>
-                    </m:r>
-                    <m:r>
-                      <a:rPr lang="en-US" sz="2500">
-                        <a:latin typeface="Cambria Math" panose="02040503050406030204" pitchFamily="18" charset="0"/>
-                      </a:rPr>
-                      <m:t>)</m:t>
-                    </m:r>
-                  </m:oMath>
-                </a14:m>
-                <a:r>
-                  <a:rPr lang="en-US" sz="2500" dirty="0"/>
-                  <a:t>?</a:t>
-                </a:r>
-              </a:p>
-            </p:txBody>
-          </p:sp>
-        </mc:Choice>
-        <mc:Fallback>
-          <p:sp>
-            <p:nvSpPr>
-              <p:cNvPr id="6" name="Rectangle 5">
-                <a:extLst>
-                  <a:ext uri="{FF2B5EF4-FFF2-40B4-BE49-F238E27FC236}">
-                    <a16:creationId xmlns:a16="http://schemas.microsoft.com/office/drawing/2014/main" id="{6C34C057-576B-E342-B07E-CB8583D26FFC}"/>
-                  </a:ext>
-                </a:extLst>
-              </p:cNvPr>
-              <p:cNvSpPr>
-                <a:spLocks noRot="1" noChangeAspect="1" noMove="1" noResize="1" noEditPoints="1" noAdjustHandles="1" noChangeArrowheads="1" noChangeShapeType="1" noTextEdit="1"/>
-              </p:cNvSpPr>
-              <p:nvPr/>
-            </p:nvSpPr>
-            <p:spPr>
-              <a:xfrm>
-                <a:off x="3590544" y="3931604"/>
-                <a:ext cx="6492240" cy="2015936"/>
-              </a:xfrm>
-              <a:prstGeom prst="rect">
-                <a:avLst/>
-              </a:prstGeom>
-              <a:blipFill>
-                <a:blip r:embed="rId2"/>
-                <a:stretch>
-                  <a:fillRect l="-1563" t="-2516" b="-6289"/>
-                </a:stretch>
-              </a:blipFill>
-            </p:spPr>
-            <p:txBody>
-              <a:bodyPr/>
-              <a:lstStyle/>
-              <a:p>
-                <a:r>
-                  <a:rPr lang="en-US">
-                    <a:noFill/>
-                  </a:rPr>
-                  <a:t> </a:t>
-                </a:r>
-              </a:p>
-            </p:txBody>
-          </p:sp>
-        </mc:Fallback>
-      </mc:AlternateContent>
-      <mc:AlternateContent xmlns:mc="http://schemas.openxmlformats.org/markup-compatibility/2006">
-        <mc:Choice xmlns:a14="http://schemas.microsoft.com/office/drawing/2010/main" Requires="a14">
-          <p:sp>
-            <p:nvSpPr>
-              <p:cNvPr id="7" name="Rectangle 6">
-                <a:extLst>
-                  <a:ext uri="{FF2B5EF4-FFF2-40B4-BE49-F238E27FC236}">
-                    <a16:creationId xmlns:a16="http://schemas.microsoft.com/office/drawing/2014/main" id="{B2ADD047-06FD-D44F-AEAA-BAC2238877D4}"/>
-                  </a:ext>
-                </a:extLst>
-              </p:cNvPr>
-              <p:cNvSpPr/>
-              <p:nvPr/>
-            </p:nvSpPr>
-            <p:spPr>
-              <a:xfrm>
-                <a:off x="6096000" y="4339407"/>
-                <a:ext cx="6096000" cy="1631216"/>
-              </a:xfrm>
-              <a:prstGeom prst="rect">
-                <a:avLst/>
-              </a:prstGeom>
-            </p:spPr>
-            <p:txBody>
-              <a:bodyPr>
-                <a:spAutoFit/>
-              </a:bodyPr>
-              <a:lstStyle/>
-              <a:p>
-                <a:r>
-                  <a:rPr lang="en-US" sz="2500" dirty="0"/>
-                  <a:t>Flowering, for plants that survive:</a:t>
-                </a:r>
-              </a:p>
-              <a:p>
-                <a:pPr lvl="1"/>
-                <a:r>
-                  <a:rPr lang="en-US" sz="2500" dirty="0"/>
-                  <a:t>What is </a:t>
-                </a:r>
-                <a14:m>
-                  <m:oMath xmlns:m="http://schemas.openxmlformats.org/officeDocument/2006/math">
-                    <m:r>
-                      <a:rPr lang="en-US" sz="2500">
-                        <a:latin typeface="Cambria Math" panose="02040503050406030204" pitchFamily="18" charset="0"/>
-                      </a:rPr>
-                      <m:t>𝑁</m:t>
-                    </m:r>
-                  </m:oMath>
-                </a14:m>
-                <a:r>
-                  <a:rPr lang="en-US" sz="2500" dirty="0"/>
-                  <a:t>?</a:t>
-                </a:r>
-              </a:p>
-              <a:p>
-                <a:pPr lvl="1"/>
-                <a:r>
-                  <a:rPr lang="en-US" sz="2500" dirty="0"/>
-                  <a:t>What is </a:t>
-                </a:r>
-                <a14:m>
-                  <m:oMath xmlns:m="http://schemas.openxmlformats.org/officeDocument/2006/math">
-                    <m:sSub>
-                      <m:sSubPr>
-                        <m:ctrlPr>
-                          <a:rPr lang="ar-AE" sz="2500" i="1">
-                            <a:latin typeface="Cambria Math" panose="02040503050406030204" pitchFamily="18" charset="0"/>
-                          </a:rPr>
-                        </m:ctrlPr>
-                      </m:sSubPr>
-                      <m:e>
-                        <m:r>
-                          <a:rPr lang="ar-AE" sz="2500">
-                            <a:latin typeface="Cambria Math" panose="02040503050406030204" pitchFamily="18" charset="0"/>
-                          </a:rPr>
-                          <m:t>𝑁</m:t>
-                        </m:r>
-                      </m:e>
-                      <m:sub>
-                        <m:r>
-                          <a:rPr lang="ar-AE" sz="2500">
-                            <a:latin typeface="Cambria Math" panose="02040503050406030204" pitchFamily="18" charset="0"/>
-                          </a:rPr>
-                          <m:t>𝐴</m:t>
-                        </m:r>
-                      </m:sub>
-                    </m:sSub>
-                  </m:oMath>
-                </a14:m>
-                <a:r>
-                  <a:rPr lang="ar-AE" sz="2500" dirty="0"/>
-                  <a:t>?</a:t>
-                </a:r>
-              </a:p>
-              <a:p>
-                <a:pPr lvl="1"/>
-                <a:r>
-                  <a:rPr lang="en-US" sz="2500" dirty="0"/>
-                  <a:t>What is </a:t>
-                </a:r>
-                <a14:m>
-                  <m:oMath xmlns:m="http://schemas.openxmlformats.org/officeDocument/2006/math">
-                    <m:r>
-                      <a:rPr lang="en-US" sz="2500">
-                        <a:latin typeface="Cambria Math" panose="02040503050406030204" pitchFamily="18" charset="0"/>
-                      </a:rPr>
-                      <m:t>𝑃</m:t>
-                    </m:r>
-                    <m:r>
-                      <a:rPr lang="en-US" sz="2500">
-                        <a:latin typeface="Cambria Math" panose="02040503050406030204" pitchFamily="18" charset="0"/>
-                      </a:rPr>
-                      <m:t>(</m:t>
-                    </m:r>
-                    <m:r>
-                      <a:rPr lang="en-US" sz="2500">
-                        <a:latin typeface="Cambria Math" panose="02040503050406030204" pitchFamily="18" charset="0"/>
-                      </a:rPr>
-                      <m:t>𝐴</m:t>
-                    </m:r>
-                    <m:r>
-                      <a:rPr lang="en-US" sz="2500">
-                        <a:latin typeface="Cambria Math" panose="02040503050406030204" pitchFamily="18" charset="0"/>
-                      </a:rPr>
-                      <m:t>)</m:t>
-                    </m:r>
-                  </m:oMath>
-                </a14:m>
-                <a:r>
-                  <a:rPr lang="en-US" sz="2500" dirty="0"/>
-                  <a:t>?</a:t>
-                </a:r>
-              </a:p>
-            </p:txBody>
-          </p:sp>
-        </mc:Choice>
-        <mc:Fallback>
-          <p:sp>
-            <p:nvSpPr>
-              <p:cNvPr id="7" name="Rectangle 6">
-                <a:extLst>
-                  <a:ext uri="{FF2B5EF4-FFF2-40B4-BE49-F238E27FC236}">
-                    <a16:creationId xmlns:a16="http://schemas.microsoft.com/office/drawing/2014/main" id="{B2ADD047-06FD-D44F-AEAA-BAC2238877D4}"/>
-                  </a:ext>
-                </a:extLst>
-              </p:cNvPr>
-              <p:cNvSpPr>
-                <a:spLocks noRot="1" noChangeAspect="1" noMove="1" noResize="1" noEditPoints="1" noAdjustHandles="1" noChangeArrowheads="1" noChangeShapeType="1" noTextEdit="1"/>
-              </p:cNvSpPr>
-              <p:nvPr/>
-            </p:nvSpPr>
-            <p:spPr>
-              <a:xfrm>
-                <a:off x="6096000" y="4339407"/>
-                <a:ext cx="6096000" cy="1631216"/>
-              </a:xfrm>
-              <a:prstGeom prst="rect">
-                <a:avLst/>
-              </a:prstGeom>
-              <a:blipFill>
-                <a:blip r:embed="rId3"/>
-                <a:stretch>
-                  <a:fillRect l="-1875" t="-3101" b="-7752"/>
-                </a:stretch>
-              </a:blipFill>
-            </p:spPr>
-            <p:txBody>
-              <a:bodyPr/>
-              <a:lstStyle/>
-              <a:p>
-                <a:r>
-                  <a:rPr lang="en-US">
-                    <a:noFill/>
-                  </a:rPr>
-                  <a:t> </a:t>
-                </a:r>
-              </a:p>
-            </p:txBody>
-          </p:sp>
-        </mc:Fallback>
-      </mc:AlternateContent>
-      <p:sp>
-        <p:nvSpPr>
-          <p:cNvPr id="8" name="Rectangle 7">
-            <a:extLst>
-              <a:ext uri="{FF2B5EF4-FFF2-40B4-BE49-F238E27FC236}">
-                <a16:creationId xmlns:a16="http://schemas.microsoft.com/office/drawing/2014/main" id="{CFE062DA-0F0F-BA44-8E45-0CD5AF45385C}"/>
-              </a:ext>
-            </a:extLst>
-          </p:cNvPr>
-          <p:cNvSpPr/>
-          <p:nvPr/>
-        </p:nvSpPr>
-        <p:spPr>
-          <a:xfrm>
-            <a:off x="896112" y="6142952"/>
-            <a:ext cx="10819638" cy="335757"/>
-          </a:xfrm>
-          <a:prstGeom prst="rect">
-            <a:avLst/>
-          </a:prstGeom>
-        </p:spPr>
-        <p:txBody>
-          <a:bodyPr wrap="square">
-            <a:noAutofit/>
-          </a:bodyPr>
-          <a:lstStyle/>
-          <a:p>
-            <a:r>
-              <a:rPr lang="en-US" b="1" dirty="0"/>
-              <a:t>FOR THOUGHT:</a:t>
-            </a:r>
-            <a:r>
-              <a:rPr lang="en-US" dirty="0"/>
-              <a:t> Based on these data, what is the probability that a plant survives AND flowers?</a:t>
-            </a:r>
-          </a:p>
-        </p:txBody>
-      </p:sp>
-    </p:spTree>
-  </p:cSld>
-  <p:clrMapOvr>
-    <a:masterClrMapping/>
-  </p:clrMapOvr>
-  <p:timing>
-    <p:tnLst>
-      <p:par>
-        <p:cTn id="1" dur="indefinite" restart="never" nodeType="tmRoot">
-          <p:childTnLst>
-            <p:seq concurrent="1" nextAc="seek">
-              <p:cTn id="2" dur="indefinite" nodeType="mainSeq">
-                <p:childTnLst>
-                  <p:par>
-                    <p:cTn id="3" fill="hold">
-                      <p:stCondLst>
-                        <p:cond delay="indefinite"/>
-                      </p:stCondLst>
-                      <p:childTnLst>
-                        <p:par>
-                          <p:cTn id="4" fill="hold">
-                            <p:stCondLst>
-                              <p:cond delay="0"/>
-                            </p:stCondLst>
-                            <p:childTnLst>
-                              <p:par>
-                                <p:cTn id="5" presetID="1" presetClass="entr" presetSubtype="0" fill="hold" grpId="0" nodeType="clickEffect">
-                                  <p:stCondLst>
-                                    <p:cond delay="0"/>
-                                  </p:stCondLst>
-                                  <p:childTnLst>
-                                    <p:set>
-                                      <p:cBhvr>
-                                        <p:cTn id="6" dur="1" fill="hold">
-                                          <p:stCondLst>
-                                            <p:cond delay="0"/>
-                                          </p:stCondLst>
-                                        </p:cTn>
-                                        <p:tgtEl>
-                                          <p:spTgt spid="6"/>
-                                        </p:tgtEl>
-                                        <p:attrNameLst>
-                                          <p:attrName>style.visibility</p:attrName>
-                                        </p:attrNameLst>
-                                      </p:cBhvr>
-                                      <p:to>
-                                        <p:strVal val="visible"/>
-                                      </p:to>
-                                    </p:set>
-                                  </p:childTnLst>
-                                </p:cTn>
-                              </p:par>
-                            </p:childTnLst>
-                          </p:cTn>
-                        </p:par>
-                      </p:childTnLst>
-                    </p:cTn>
-                  </p:par>
-                  <p:par>
-                    <p:cTn id="7" fill="hold">
-                      <p:stCondLst>
-                        <p:cond delay="indefinite"/>
-                      </p:stCondLst>
-                      <p:childTnLst>
-                        <p:par>
-                          <p:cTn id="8" fill="hold">
-                            <p:stCondLst>
-                              <p:cond delay="0"/>
-                            </p:stCondLst>
-                            <p:childTnLst>
-                              <p:par>
-                                <p:cTn id="9" presetID="1" presetClass="entr" presetSubtype="0" fill="hold" grpId="0" nodeType="clickEffect">
-                                  <p:stCondLst>
-                                    <p:cond delay="0"/>
-                                  </p:stCondLst>
-                                  <p:childTnLst>
-                                    <p:set>
-                                      <p:cBhvr>
-                                        <p:cTn id="10" dur="1" fill="hold">
-                                          <p:stCondLst>
-                                            <p:cond delay="0"/>
-                                          </p:stCondLst>
-                                        </p:cTn>
-                                        <p:tgtEl>
-                                          <p:spTgt spid="7"/>
-                                        </p:tgtEl>
-                                        <p:attrNameLst>
-                                          <p:attrName>style.visibility</p:attrName>
-                                        </p:attrNameLst>
-                                      </p:cBhvr>
-                                      <p:to>
-                                        <p:strVal val="visible"/>
-                                      </p:to>
-                                    </p:set>
-                                  </p:childTnLst>
-                                </p:cTn>
-                              </p:par>
-                            </p:childTnLst>
-                          </p:cTn>
-                        </p:par>
-                      </p:childTnLst>
-                    </p:cTn>
-                  </p:par>
-                  <p:par>
-                    <p:cTn id="11" fill="hold">
-                      <p:stCondLst>
-                        <p:cond delay="indefinite"/>
-                      </p:stCondLst>
-                      <p:childTnLst>
-                        <p:par>
-                          <p:cTn id="12" fill="hold">
-                            <p:stCondLst>
-                              <p:cond delay="0"/>
-                            </p:stCondLst>
-                            <p:childTnLst>
-                              <p:par>
-                                <p:cTn id="13" presetID="1" presetClass="entr" presetSubtype="0" fill="hold" grpId="0" nodeType="clickEffect">
-                                  <p:stCondLst>
-                                    <p:cond delay="0"/>
-                                  </p:stCondLst>
-                                  <p:childTnLst>
-                                    <p:set>
-                                      <p:cBhvr>
-                                        <p:cTn id="14" dur="1" fill="hold">
-                                          <p:stCondLst>
-                                            <p:cond delay="0"/>
-                                          </p:stCondLst>
-                                        </p:cTn>
-                                        <p:tgtEl>
-                                          <p:spTgt spid="8"/>
-                                        </p:tgtEl>
-                                        <p:attrNameLst>
-                                          <p:attrName>style.visibility</p:attrName>
-                                        </p:attrNameLst>
-                                      </p:cBhvr>
-                                      <p:to>
-                                        <p:strVal val="visible"/>
-                                      </p:to>
-                                    </p:set>
-                                  </p:childTnLst>
-                                </p:cTn>
-                              </p:par>
-                            </p:childTnLst>
-                          </p:cTn>
-                        </p:par>
-                      </p:childTnLst>
-                    </p:cTn>
-                  </p:par>
-                </p:childTnLst>
-              </p:cTn>
-              <p:prevCondLst>
-                <p:cond evt="onPrev" delay="0">
-                  <p:tgtEl>
-                    <p:sldTgt/>
-                  </p:tgtEl>
-                </p:cond>
-              </p:prevCondLst>
-              <p:nextCondLst>
-                <p:cond evt="onNext" delay="0">
-                  <p:tgtEl>
-                    <p:sldTgt/>
-                  </p:tgtEl>
-                </p:cond>
-              </p:nextCondLst>
-            </p:seq>
-          </p:childTnLst>
-        </p:cTn>
-      </p:par>
-    </p:tnLst>
-    <p:bldLst>
-      <p:bldP spid="6" grpId="0"/>
-      <p:bldP spid="7" grpId="0"/>
-      <p:bldP spid="8" grpId="0"/>
-    </p:bldLst>
-  </p:timing>
 </p:sld>
 </file>
 

</xml_diff>